<commit_message>
Moved C Programs in Single Repro
C Programs moved

Signed-off-by: Paul McQuade <paulmcquad@gmail.com>
</commit_message>
<xml_diff>
--- a/TALKS/Week 1 - About C.pptx
+++ b/TALKS/Week 1 - About C.pptx
@@ -5,14 +5,13 @@
     <p:sldMasterId id="2147483660" r:id="rId1"/>
   </p:sldMasterIdLst>
   <p:notesMasterIdLst>
-    <p:notesMasterId r:id="rId7"/>
+    <p:notesMasterId r:id="rId6"/>
   </p:notesMasterIdLst>
   <p:sldIdLst>
     <p:sldId id="257" r:id="rId2"/>
     <p:sldId id="260" r:id="rId3"/>
     <p:sldId id="262" r:id="rId4"/>
-    <p:sldId id="261" r:id="rId5"/>
-    <p:sldId id="263" r:id="rId6"/>
+    <p:sldId id="263" r:id="rId5"/>
   </p:sldIdLst>
   <p:sldSz cx="12192000" cy="6858000"/>
   <p:notesSz cx="6858000" cy="9144000"/>
@@ -201,7 +200,7 @@
           <a:p>
             <a:fld id="{C1668DB4-2045-4B9A-B248-A03384074F1F}" type="datetimeFigureOut">
               <a:rPr lang="en-IE" smtClean="0"/>
-              <a:t>25/10/2016</a:t>
+              <a:t>22/11/2016</a:t>
             </a:fld>
             <a:endParaRPr lang="en-IE"/>
           </a:p>
@@ -884,7 +883,7 @@
           <a:p>
             <a:fld id="{5CA671B1-CEF2-40E0-BB7E-E71B13289322}" type="datetimeFigureOut">
               <a:rPr lang="en-IE" smtClean="0"/>
-              <a:t>25/10/2016</a:t>
+              <a:t>22/11/2016</a:t>
             </a:fld>
             <a:endParaRPr lang="en-IE"/>
           </a:p>
@@ -1208,7 +1207,7 @@
           <a:p>
             <a:fld id="{5CA671B1-CEF2-40E0-BB7E-E71B13289322}" type="datetimeFigureOut">
               <a:rPr lang="en-IE" smtClean="0"/>
-              <a:t>25/10/2016</a:t>
+              <a:t>22/11/2016</a:t>
             </a:fld>
             <a:endParaRPr lang="en-IE"/>
           </a:p>
@@ -1456,7 +1455,7 @@
           <a:p>
             <a:fld id="{5CA671B1-CEF2-40E0-BB7E-E71B13289322}" type="datetimeFigureOut">
               <a:rPr lang="en-IE" smtClean="0"/>
-              <a:t>25/10/2016</a:t>
+              <a:t>22/11/2016</a:t>
             </a:fld>
             <a:endParaRPr lang="en-IE"/>
           </a:p>
@@ -1795,7 +1794,7 @@
           <a:p>
             <a:fld id="{5CA671B1-CEF2-40E0-BB7E-E71B13289322}" type="datetimeFigureOut">
               <a:rPr lang="en-IE" smtClean="0"/>
-              <a:t>25/10/2016</a:t>
+              <a:t>22/11/2016</a:t>
             </a:fld>
             <a:endParaRPr lang="en-IE"/>
           </a:p>
@@ -2142,7 +2141,7 @@
           <a:p>
             <a:fld id="{5CA671B1-CEF2-40E0-BB7E-E71B13289322}" type="datetimeFigureOut">
               <a:rPr lang="en-IE" smtClean="0"/>
-              <a:t>25/10/2016</a:t>
+              <a:t>22/11/2016</a:t>
             </a:fld>
             <a:endParaRPr lang="en-IE"/>
           </a:p>
@@ -2516,7 +2515,7 @@
           <a:p>
             <a:fld id="{5CA671B1-CEF2-40E0-BB7E-E71B13289322}" type="datetimeFigureOut">
               <a:rPr lang="en-IE" smtClean="0"/>
-              <a:t>25/10/2016</a:t>
+              <a:t>22/11/2016</a:t>
             </a:fld>
             <a:endParaRPr lang="en-IE"/>
           </a:p>
@@ -2986,7 +2985,7 @@
           <a:p>
             <a:fld id="{5CA671B1-CEF2-40E0-BB7E-E71B13289322}" type="datetimeFigureOut">
               <a:rPr lang="en-IE" smtClean="0"/>
-              <a:t>25/10/2016</a:t>
+              <a:t>22/11/2016</a:t>
             </a:fld>
             <a:endParaRPr lang="en-IE"/>
           </a:p>
@@ -3191,7 +3190,7 @@
           <a:p>
             <a:fld id="{5CA671B1-CEF2-40E0-BB7E-E71B13289322}" type="datetimeFigureOut">
               <a:rPr lang="en-IE" smtClean="0"/>
-              <a:t>25/10/2016</a:t>
+              <a:t>22/11/2016</a:t>
             </a:fld>
             <a:endParaRPr lang="en-IE"/>
           </a:p>
@@ -3402,7 +3401,7 @@
           <a:p>
             <a:fld id="{5CA671B1-CEF2-40E0-BB7E-E71B13289322}" type="datetimeFigureOut">
               <a:rPr lang="en-IE" smtClean="0"/>
-              <a:t>25/10/2016</a:t>
+              <a:t>22/11/2016</a:t>
             </a:fld>
             <a:endParaRPr lang="en-IE"/>
           </a:p>
@@ -3634,7 +3633,7 @@
           <a:p>
             <a:fld id="{5CA671B1-CEF2-40E0-BB7E-E71B13289322}" type="datetimeFigureOut">
               <a:rPr lang="en-IE" smtClean="0"/>
-              <a:t>25/10/2016</a:t>
+              <a:t>22/11/2016</a:t>
             </a:fld>
             <a:endParaRPr lang="en-IE"/>
           </a:p>
@@ -3882,7 +3881,7 @@
           <a:p>
             <a:fld id="{5CA671B1-CEF2-40E0-BB7E-E71B13289322}" type="datetimeFigureOut">
               <a:rPr lang="en-IE" smtClean="0"/>
-              <a:t>25/10/2016</a:t>
+              <a:t>22/11/2016</a:t>
             </a:fld>
             <a:endParaRPr lang="en-IE"/>
           </a:p>
@@ -4180,7 +4179,7 @@
           <a:p>
             <a:fld id="{5CA671B1-CEF2-40E0-BB7E-E71B13289322}" type="datetimeFigureOut">
               <a:rPr lang="en-IE" smtClean="0"/>
-              <a:t>25/10/2016</a:t>
+              <a:t>22/11/2016</a:t>
             </a:fld>
             <a:endParaRPr lang="en-IE"/>
           </a:p>
@@ -4574,7 +4573,7 @@
           <a:p>
             <a:fld id="{5CA671B1-CEF2-40E0-BB7E-E71B13289322}" type="datetimeFigureOut">
               <a:rPr lang="en-IE" smtClean="0"/>
-              <a:t>25/10/2016</a:t>
+              <a:t>22/11/2016</a:t>
             </a:fld>
             <a:endParaRPr lang="en-IE"/>
           </a:p>
@@ -4723,7 +4722,7 @@
           <a:p>
             <a:fld id="{5CA671B1-CEF2-40E0-BB7E-E71B13289322}" type="datetimeFigureOut">
               <a:rPr lang="en-IE" smtClean="0"/>
-              <a:t>25/10/2016</a:t>
+              <a:t>22/11/2016</a:t>
             </a:fld>
             <a:endParaRPr lang="en-IE"/>
           </a:p>
@@ -4849,7 +4848,7 @@
           <a:p>
             <a:fld id="{5CA671B1-CEF2-40E0-BB7E-E71B13289322}" type="datetimeFigureOut">
               <a:rPr lang="en-IE" smtClean="0"/>
-              <a:t>25/10/2016</a:t>
+              <a:t>22/11/2016</a:t>
             </a:fld>
             <a:endParaRPr lang="en-IE"/>
           </a:p>
@@ -5104,7 +5103,7 @@
           <a:p>
             <a:fld id="{5CA671B1-CEF2-40E0-BB7E-E71B13289322}" type="datetimeFigureOut">
               <a:rPr lang="en-IE" smtClean="0"/>
-              <a:t>25/10/2016</a:t>
+              <a:t>22/11/2016</a:t>
             </a:fld>
             <a:endParaRPr lang="en-IE"/>
           </a:p>
@@ -5419,7 +5418,7 @@
           <a:p>
             <a:fld id="{5CA671B1-CEF2-40E0-BB7E-E71B13289322}" type="datetimeFigureOut">
               <a:rPr lang="en-IE" smtClean="0"/>
-              <a:t>25/10/2016</a:t>
+              <a:t>22/11/2016</a:t>
             </a:fld>
             <a:endParaRPr lang="en-IE"/>
           </a:p>
@@ -5770,7 +5769,7 @@
           <a:p>
             <a:fld id="{5CA671B1-CEF2-40E0-BB7E-E71B13289322}" type="datetimeFigureOut">
               <a:rPr lang="en-IE" smtClean="0"/>
-              <a:t>25/10/2016</a:t>
+              <a:t>22/11/2016</a:t>
             </a:fld>
             <a:endParaRPr lang="en-IE"/>
           </a:p>
@@ -6697,127 +6696,6 @@
           <a:p>
             <a:r>
               <a:rPr lang="en-IE" dirty="0"/>
-              <a:t>Why C is better than </a:t>
-            </a:r>
-            <a:r>
-              <a:rPr lang="en-IE"/>
-              <a:t>C++?</a:t>
-            </a:r>
-            <a:endParaRPr lang="en-IE" dirty="0"/>
-          </a:p>
-        </p:txBody>
-      </p:sp>
-      <p:sp>
-        <p:nvSpPr>
-          <p:cNvPr id="3" name="Content Placeholder 2"/>
-          <p:cNvSpPr>
-            <a:spLocks noGrp="1"/>
-          </p:cNvSpPr>
-          <p:nvPr>
-            <p:ph idx="1"/>
-          </p:nvPr>
-        </p:nvSpPr>
-        <p:spPr/>
-        <p:txBody>
-          <a:bodyPr/>
-          <a:lstStyle/>
-          <a:p>
-            <a:pPr marL="0" indent="0">
-              <a:buNone/>
-            </a:pPr>
-            <a:r>
-              <a:rPr lang="en-IE" dirty="0"/>
-              <a:t>Linus Torvalds on C++</a:t>
-            </a:r>
-          </a:p>
-          <a:p>
-            <a:r>
-              <a:rPr lang="en-IE" dirty="0">
-                <a:hlinkClick r:id="rId2"/>
-              </a:rPr>
-              <a:t>http://harmful.cat-v.org/software/c++/linus</a:t>
-            </a:r>
-            <a:endParaRPr lang="en-IE" dirty="0"/>
-          </a:p>
-          <a:p>
-            <a:pPr marL="0" indent="0">
-              <a:buNone/>
-            </a:pPr>
-            <a:r>
-              <a:rPr lang="en-IE" dirty="0"/>
-              <a:t>Why would anybody use C over C++?</a:t>
-            </a:r>
-          </a:p>
-          <a:p>
-            <a:r>
-              <a:rPr lang="en-IE" dirty="0">
-                <a:hlinkClick r:id="rId3"/>
-              </a:rPr>
-              <a:t>https</a:t>
-            </a:r>
-            <a:r>
-              <a:rPr lang="en-IE">
-                <a:hlinkClick r:id="rId3"/>
-              </a:rPr>
-              <a:t>://stackoverflow.com/questions/497786/why-would-anybody-use-c-over-c</a:t>
-            </a:r>
-            <a:endParaRPr lang="en-IE"/>
-          </a:p>
-          <a:p>
-            <a:pPr marL="0" indent="0">
-              <a:buNone/>
-            </a:pPr>
-            <a:endParaRPr lang="en-IE" dirty="0"/>
-          </a:p>
-        </p:txBody>
-      </p:sp>
-    </p:spTree>
-    <p:extLst>
-      <p:ext uri="{BB962C8B-B14F-4D97-AF65-F5344CB8AC3E}">
-        <p14:creationId xmlns:p14="http://schemas.microsoft.com/office/powerpoint/2010/main" val="1030545161"/>
-      </p:ext>
-    </p:extLst>
-  </p:cSld>
-  <p:clrMapOvr>
-    <a:masterClrMapping/>
-  </p:clrMapOvr>
-</p:sld>
-</file>
-
-<file path=ppt/slides/slide5.xml><?xml version="1.0" encoding="utf-8"?>
-<p:sld xmlns:a="http://schemas.openxmlformats.org/drawingml/2006/main" xmlns:r="http://schemas.openxmlformats.org/officeDocument/2006/relationships" xmlns:p="http://schemas.openxmlformats.org/presentationml/2006/main">
-  <p:cSld>
-    <p:spTree>
-      <p:nvGrpSpPr>
-        <p:cNvPr id="1" name=""/>
-        <p:cNvGrpSpPr/>
-        <p:nvPr/>
-      </p:nvGrpSpPr>
-      <p:grpSpPr>
-        <a:xfrm>
-          <a:off x="0" y="0"/>
-          <a:ext cx="0" cy="0"/>
-          <a:chOff x="0" y="0"/>
-          <a:chExt cx="0" cy="0"/>
-        </a:xfrm>
-      </p:grpSpPr>
-      <p:sp>
-        <p:nvSpPr>
-          <p:cNvPr id="2" name="Title 1"/>
-          <p:cNvSpPr>
-            <a:spLocks noGrp="1"/>
-          </p:cNvSpPr>
-          <p:nvPr>
-            <p:ph type="title"/>
-          </p:nvPr>
-        </p:nvSpPr>
-        <p:spPr/>
-        <p:txBody>
-          <a:bodyPr/>
-          <a:lstStyle/>
-          <a:p>
-            <a:r>
-              <a:rPr lang="en-IE" dirty="0"/>
               <a:t>What next?</a:t>
             </a:r>
           </a:p>
@@ -6844,9 +6722,13 @@
             </a:r>
             <a:r>
               <a:rPr lang="en-IE"/>
-              <a:t>: Tog-Coders-Night\CODE\C</a:t>
-            </a:r>
-            <a:endParaRPr lang="en-IE" dirty="0"/>
+              <a:t>: </a:t>
+            </a:r>
+            <a:r>
+              <a:rPr lang="en-IE"/>
+              <a:t>https://github.com/paulmcquad/C</a:t>
+            </a:r>
+            <a:endParaRPr lang="en-IE"/>
           </a:p>
           <a:p>
             <a:r>

</xml_diff>